<commit_message>
New FK syntax example
</commit_message>
<xml_diff>
--- a/Presentation/Intro_to_Relational_Databases_with_MySQL_Day1.pptx
+++ b/Presentation/Intro_to_Relational_Databases_with_MySQL_Day1.pptx
@@ -5,7 +5,7 @@
     <p:sldMasterId id="2147483648" r:id="rId1"/>
   </p:sldMasterIdLst>
   <p:notesMasterIdLst>
-    <p:notesMasterId r:id="rId56"/>
+    <p:notesMasterId r:id="rId57"/>
   </p:notesMasterIdLst>
   <p:sldIdLst>
     <p:sldId id="257" r:id="rId2"/>
@@ -49,8 +49,8 @@
     <p:sldId id="298" r:id="rId40"/>
     <p:sldId id="299" r:id="rId41"/>
     <p:sldId id="300" r:id="rId42"/>
-    <p:sldId id="301" r:id="rId43"/>
-    <p:sldId id="315" r:id="rId44"/>
+    <p:sldId id="324" r:id="rId43"/>
+    <p:sldId id="301" r:id="rId44"/>
     <p:sldId id="302" r:id="rId45"/>
     <p:sldId id="303" r:id="rId46"/>
     <p:sldId id="304" r:id="rId47"/>
@@ -60,8 +60,9 @@
     <p:sldId id="308" r:id="rId51"/>
     <p:sldId id="309" r:id="rId52"/>
     <p:sldId id="310" r:id="rId53"/>
-    <p:sldId id="312" r:id="rId54"/>
-    <p:sldId id="256" r:id="rId55"/>
+    <p:sldId id="315" r:id="rId54"/>
+    <p:sldId id="312" r:id="rId55"/>
+    <p:sldId id="256" r:id="rId56"/>
   </p:sldIdLst>
   <p:sldSz cx="9144000" cy="6858000" type="screen4x3"/>
   <p:notesSz cx="6858000" cy="9144000"/>
@@ -245,7 +246,7 @@
           <a:p>
             <a:fld id="{3C17D7B1-051A-480C-B74F-6E51D3B48779}" type="datetimeFigureOut">
               <a:rPr lang="en-US" smtClean="0"/>
-              <a:t>03/30/2014</a:t>
+              <a:t>04/01/2014</a:t>
             </a:fld>
             <a:endParaRPr lang="en-US"/>
           </a:p>
@@ -778,7 +779,7 @@
           <a:p>
             <a:fld id="{37B5124A-9188-46BD-942B-A956A1FC0D26}" type="datetimeFigureOut">
               <a:rPr lang="en-US" smtClean="0"/>
-              <a:t>03/30/2014</a:t>
+              <a:t>04/01/2014</a:t>
             </a:fld>
             <a:endParaRPr lang="en-US"/>
           </a:p>
@@ -948,7 +949,7 @@
           <a:p>
             <a:fld id="{37B5124A-9188-46BD-942B-A956A1FC0D26}" type="datetimeFigureOut">
               <a:rPr lang="en-US" smtClean="0"/>
-              <a:t>03/30/2014</a:t>
+              <a:t>04/01/2014</a:t>
             </a:fld>
             <a:endParaRPr lang="en-US"/>
           </a:p>
@@ -1128,7 +1129,7 @@
           <a:p>
             <a:fld id="{37B5124A-9188-46BD-942B-A956A1FC0D26}" type="datetimeFigureOut">
               <a:rPr lang="en-US" smtClean="0"/>
-              <a:t>03/30/2014</a:t>
+              <a:t>04/01/2014</a:t>
             </a:fld>
             <a:endParaRPr lang="en-US"/>
           </a:p>
@@ -1298,7 +1299,7 @@
           <a:p>
             <a:fld id="{37B5124A-9188-46BD-942B-A956A1FC0D26}" type="datetimeFigureOut">
               <a:rPr lang="en-US" smtClean="0"/>
-              <a:t>03/30/2014</a:t>
+              <a:t>04/01/2014</a:t>
             </a:fld>
             <a:endParaRPr lang="en-US"/>
           </a:p>
@@ -1544,7 +1545,7 @@
           <a:p>
             <a:fld id="{37B5124A-9188-46BD-942B-A956A1FC0D26}" type="datetimeFigureOut">
               <a:rPr lang="en-US" smtClean="0"/>
-              <a:t>03/30/2014</a:t>
+              <a:t>04/01/2014</a:t>
             </a:fld>
             <a:endParaRPr lang="en-US"/>
           </a:p>
@@ -1832,7 +1833,7 @@
           <a:p>
             <a:fld id="{37B5124A-9188-46BD-942B-A956A1FC0D26}" type="datetimeFigureOut">
               <a:rPr lang="en-US" smtClean="0"/>
-              <a:t>03/30/2014</a:t>
+              <a:t>04/01/2014</a:t>
             </a:fld>
             <a:endParaRPr lang="en-US"/>
           </a:p>
@@ -2254,7 +2255,7 @@
           <a:p>
             <a:fld id="{37B5124A-9188-46BD-942B-A956A1FC0D26}" type="datetimeFigureOut">
               <a:rPr lang="en-US" smtClean="0"/>
-              <a:t>03/30/2014</a:t>
+              <a:t>04/01/2014</a:t>
             </a:fld>
             <a:endParaRPr lang="en-US"/>
           </a:p>
@@ -2372,7 +2373,7 @@
           <a:p>
             <a:fld id="{37B5124A-9188-46BD-942B-A956A1FC0D26}" type="datetimeFigureOut">
               <a:rPr lang="en-US" smtClean="0"/>
-              <a:t>03/30/2014</a:t>
+              <a:t>04/01/2014</a:t>
             </a:fld>
             <a:endParaRPr lang="en-US"/>
           </a:p>
@@ -2467,7 +2468,7 @@
           <a:p>
             <a:fld id="{37B5124A-9188-46BD-942B-A956A1FC0D26}" type="datetimeFigureOut">
               <a:rPr lang="en-US" smtClean="0"/>
-              <a:t>03/30/2014</a:t>
+              <a:t>04/01/2014</a:t>
             </a:fld>
             <a:endParaRPr lang="en-US"/>
           </a:p>
@@ -2744,7 +2745,7 @@
           <a:p>
             <a:fld id="{37B5124A-9188-46BD-942B-A956A1FC0D26}" type="datetimeFigureOut">
               <a:rPr lang="en-US" smtClean="0"/>
-              <a:t>03/30/2014</a:t>
+              <a:t>04/01/2014</a:t>
             </a:fld>
             <a:endParaRPr lang="en-US"/>
           </a:p>
@@ -2997,7 +2998,7 @@
           <a:p>
             <a:fld id="{37B5124A-9188-46BD-942B-A956A1FC0D26}" type="datetimeFigureOut">
               <a:rPr lang="en-US" smtClean="0"/>
-              <a:t>03/30/2014</a:t>
+              <a:t>04/01/2014</a:t>
             </a:fld>
             <a:endParaRPr lang="en-US"/>
           </a:p>
@@ -3210,7 +3211,7 @@
           <a:p>
             <a:fld id="{37B5124A-9188-46BD-942B-A956A1FC0D26}" type="datetimeFigureOut">
               <a:rPr lang="en-US" smtClean="0"/>
-              <a:t>03/30/2014</a:t>
+              <a:t>04/01/2014</a:t>
             </a:fld>
             <a:endParaRPr lang="en-US"/>
           </a:p>
@@ -7058,11 +7059,7 @@
             </a:r>
             <a:r>
               <a:rPr lang="en-US" sz="3200" dirty="0"/>
-              <a:t>want to update a customer’s last name in more than one </a:t>
-            </a:r>
-            <a:r>
-              <a:rPr lang="en-US" sz="3200" dirty="0"/>
-              <a:t>table</a:t>
+              <a:t>want to update a customer’s last name in more than one table</a:t>
             </a:r>
           </a:p>
           <a:p>
@@ -10038,7 +10035,6 @@
                         <a:rPr lang="en-US" sz="1200" dirty="0" smtClean="0"/>
                         <a:t>1986</a:t>
                       </a:r>
-                      <a:endParaRPr lang="en-US" sz="1200" dirty="0" smtClean="0"/>
                     </a:p>
                   </a:txBody>
                   <a:tcPr/>
@@ -10154,7 +10150,6 @@
                         <a:rPr lang="en-US" sz="1200" dirty="0" smtClean="0"/>
                         <a:t>1987</a:t>
                       </a:r>
-                      <a:endParaRPr lang="en-US" sz="1200" dirty="0" smtClean="0"/>
                     </a:p>
                   </a:txBody>
                   <a:tcPr/>
@@ -10758,7 +10753,6 @@
                         <a:rPr lang="en-US" sz="1200" dirty="0" smtClean="0"/>
                         <a:t>1986</a:t>
                       </a:r>
-                      <a:endParaRPr lang="en-US" sz="1200" dirty="0" smtClean="0"/>
                     </a:p>
                   </a:txBody>
                   <a:tcPr/>
@@ -10875,7 +10869,6 @@
                         <a:rPr lang="en-US" sz="1200" dirty="0" smtClean="0"/>
                         <a:t>1987</a:t>
                       </a:r>
-                      <a:endParaRPr lang="en-US" sz="1200" dirty="0" smtClean="0"/>
                     </a:p>
                   </a:txBody>
                   <a:tcPr/>
@@ -13030,25 +13023,7 @@
                 </a:solidFill>
                 <a:latin typeface="Nina Compressed"/>
               </a:rPr>
-              <a:t>In the relational model of a database, all data is represented in terms of </a:t>
-            </a:r>
-            <a:r>
-              <a:rPr lang="en-US" sz="2000" b="0" i="0" u="none" spc="0" dirty="0" smtClean="0">
-                <a:solidFill>
-                  <a:srgbClr val="000000"/>
-                </a:solidFill>
-                <a:latin typeface="Nina Compressed"/>
-              </a:rPr>
-              <a:t>rows, </a:t>
-            </a:r>
-            <a:r>
-              <a:rPr lang="en-US" sz="2000" b="0" i="0" u="none" spc="0" dirty="0" smtClean="0">
-                <a:solidFill>
-                  <a:srgbClr val="000000"/>
-                </a:solidFill>
-                <a:latin typeface="Nina Compressed"/>
-              </a:rPr>
-              <a:t>grouped into </a:t>
+              <a:t>In the relational model of a database, all data is represented in terms of rows, grouped into </a:t>
             </a:r>
             <a:r>
               <a:rPr lang="en-US" sz="2000" dirty="0" smtClean="0">
@@ -13066,16 +13041,7 @@
                 </a:solidFill>
                 <a:latin typeface="Nina Compressed"/>
               </a:rPr>
-              <a:t>. A </a:t>
-            </a:r>
-            <a:r>
-              <a:rPr lang="en-US" sz="2000" b="0" i="0" u="none" spc="0" dirty="0" smtClean="0">
-                <a:solidFill>
-                  <a:srgbClr val="000000"/>
-                </a:solidFill>
-                <a:latin typeface="Nina Compressed"/>
-              </a:rPr>
-              <a:t>database organized in terms of the relational model is a relational database.</a:t>
+              <a:t>. A database organized in terms of the relational model is a relational database.</a:t>
             </a:r>
           </a:p>
           <a:p>
@@ -13901,7 +13867,6 @@
               <a:rPr lang="en-US" dirty="0" smtClean="0"/>
               <a:t>bands</a:t>
             </a:r>
-            <a:endParaRPr lang="en-US" dirty="0" smtClean="0"/>
           </a:p>
         </p:txBody>
       </p:sp>
@@ -14307,6 +14272,290 @@
         </p:nvSpPr>
         <p:spPr>
           <a:xfrm>
+            <a:off x="457200" y="152400"/>
+            <a:ext cx="8229600" cy="715962"/>
+          </a:xfrm>
+        </p:spPr>
+        <p:txBody>
+          <a:bodyPr>
+            <a:normAutofit fontScale="90000"/>
+          </a:bodyPr>
+          <a:lstStyle/>
+          <a:p>
+            <a:r>
+              <a:rPr lang="en-US" dirty="0" smtClean="0"/>
+              <a:t>FOREIGN KEYS</a:t>
+            </a:r>
+            <a:endParaRPr lang="en-US" dirty="0"/>
+          </a:p>
+        </p:txBody>
+      </p:sp>
+      <p:sp>
+        <p:nvSpPr>
+          <p:cNvPr id="3" name="Content Placeholder 2"/>
+          <p:cNvSpPr>
+            <a:spLocks noGrp="1"/>
+          </p:cNvSpPr>
+          <p:nvPr>
+            <p:ph idx="1"/>
+          </p:nvPr>
+        </p:nvSpPr>
+        <p:spPr>
+          <a:xfrm>
+            <a:off x="228600" y="762000"/>
+            <a:ext cx="3886200" cy="3429000"/>
+          </a:xfrm>
+        </p:spPr>
+        <p:txBody>
+          <a:bodyPr>
+            <a:noAutofit/>
+          </a:bodyPr>
+          <a:lstStyle/>
+          <a:p>
+            <a:pPr marL="0" indent="0">
+              <a:buNone/>
+            </a:pPr>
+            <a:r>
+              <a:rPr lang="en-US" sz="2800" b="1" dirty="0"/>
+              <a:t>Automobile Table</a:t>
+            </a:r>
+          </a:p>
+          <a:p>
+            <a:pPr marL="0" indent="0">
+              <a:buNone/>
+            </a:pPr>
+            <a:r>
+              <a:rPr lang="en-US" sz="2800" dirty="0"/>
+              <a:t>CREATE TABLE Automobile (</a:t>
+            </a:r>
+          </a:p>
+          <a:p>
+            <a:pPr marL="0" indent="0">
+              <a:buNone/>
+            </a:pPr>
+            <a:r>
+              <a:rPr lang="en-US" sz="2800" dirty="0"/>
+              <a:t>ID INT NOT NULL</a:t>
+            </a:r>
+          </a:p>
+          <a:p>
+            <a:pPr marL="0" indent="0">
+              <a:buNone/>
+            </a:pPr>
+            <a:r>
+              <a:rPr lang="en-US" sz="2800" dirty="0"/>
+              <a:t>, NAME VARCHAR(25) NOT NULL</a:t>
+            </a:r>
+          </a:p>
+          <a:p>
+            <a:pPr marL="0" indent="0">
+              <a:buNone/>
+            </a:pPr>
+            <a:r>
+              <a:rPr lang="en-US" sz="2800" dirty="0"/>
+              <a:t>, PRIMARY KEY (ID)</a:t>
+            </a:r>
+          </a:p>
+          <a:p>
+            <a:pPr marL="0" indent="0">
+              <a:buNone/>
+            </a:pPr>
+            <a:r>
+              <a:rPr lang="en-US" sz="2800" dirty="0"/>
+              <a:t>) ENGINE=INNODB</a:t>
+            </a:r>
+            <a:r>
+              <a:rPr lang="en-US" sz="2800" dirty="0" smtClean="0"/>
+              <a:t>;</a:t>
+            </a:r>
+          </a:p>
+          <a:p>
+            <a:pPr marL="0" indent="0">
+              <a:buNone/>
+            </a:pPr>
+            <a:endParaRPr lang="en-US" sz="2800" dirty="0"/>
+          </a:p>
+          <a:p>
+            <a:pPr marL="0" indent="0">
+              <a:buNone/>
+            </a:pPr>
+            <a:endParaRPr lang="en-US" sz="2800" dirty="0"/>
+          </a:p>
+          <a:p>
+            <a:pPr marL="0" indent="0">
+              <a:buNone/>
+            </a:pPr>
+            <a:endParaRPr lang="en-US" sz="2800" dirty="0"/>
+          </a:p>
+        </p:txBody>
+      </p:sp>
+      <p:sp>
+        <p:nvSpPr>
+          <p:cNvPr id="5" name="Rectangle 4"/>
+          <p:cNvSpPr/>
+          <p:nvPr/>
+        </p:nvSpPr>
+        <p:spPr>
+          <a:xfrm>
+            <a:off x="3799114" y="762000"/>
+            <a:ext cx="4953000" cy="5693866"/>
+          </a:xfrm>
+          <a:prstGeom prst="rect">
+            <a:avLst/>
+          </a:prstGeom>
+        </p:spPr>
+        <p:txBody>
+          <a:bodyPr wrap="square">
+            <a:spAutoFit/>
+          </a:bodyPr>
+          <a:lstStyle/>
+          <a:p>
+            <a:r>
+              <a:rPr lang="en-US" sz="2800" b="1" dirty="0"/>
+              <a:t>Engine</a:t>
+            </a:r>
+            <a:r>
+              <a:rPr lang="en-US" sz="2800" dirty="0"/>
+              <a:t> Table</a:t>
+            </a:r>
+          </a:p>
+          <a:p>
+            <a:r>
+              <a:rPr lang="en-US" sz="2800" dirty="0" smtClean="0"/>
+              <a:t>CREATE </a:t>
+            </a:r>
+            <a:r>
+              <a:rPr lang="en-US" sz="2800" dirty="0"/>
+              <a:t>TABLE Engine </a:t>
+            </a:r>
+          </a:p>
+          <a:p>
+            <a:r>
+              <a:rPr lang="en-US" sz="2800" dirty="0"/>
+              <a:t>(ID INT NOT NULL</a:t>
+            </a:r>
+          </a:p>
+          <a:p>
+            <a:r>
+              <a:rPr lang="en-US" sz="2800" dirty="0"/>
+              <a:t>, </a:t>
+            </a:r>
+            <a:r>
+              <a:rPr lang="en-US" sz="2800" dirty="0" err="1"/>
+              <a:t>AutomobileID</a:t>
+            </a:r>
+            <a:r>
+              <a:rPr lang="en-US" sz="2800" dirty="0"/>
+              <a:t> INT NOT NULL</a:t>
+            </a:r>
+          </a:p>
+          <a:p>
+            <a:r>
+              <a:rPr lang="en-US" sz="2800" dirty="0"/>
+              <a:t>, </a:t>
+            </a:r>
+            <a:r>
+              <a:rPr lang="en-US" sz="2800" dirty="0" err="1"/>
+              <a:t>EngineSize</a:t>
+            </a:r>
+            <a:r>
+              <a:rPr lang="en-US" sz="2800" dirty="0"/>
+              <a:t> DECIMAL (2,1) NOT NULL</a:t>
+            </a:r>
+          </a:p>
+          <a:p>
+            <a:r>
+              <a:rPr lang="en-US" sz="2800" dirty="0"/>
+              <a:t>,INDEX </a:t>
+            </a:r>
+            <a:r>
+              <a:rPr lang="en-US" sz="2800" dirty="0" err="1"/>
+              <a:t>AutomobileID_idx</a:t>
+            </a:r>
+            <a:r>
+              <a:rPr lang="en-US" sz="2800" dirty="0"/>
+              <a:t> (</a:t>
+            </a:r>
+            <a:r>
+              <a:rPr lang="en-US" sz="2800" dirty="0" err="1"/>
+              <a:t>AutomobileID</a:t>
+            </a:r>
+            <a:r>
+              <a:rPr lang="en-US" sz="2800" dirty="0"/>
+              <a:t>),</a:t>
+            </a:r>
+          </a:p>
+          <a:p>
+            <a:r>
+              <a:rPr lang="en-US" sz="2800" dirty="0"/>
+              <a:t>FOREIGN KEY (</a:t>
+            </a:r>
+            <a:r>
+              <a:rPr lang="en-US" sz="2800" dirty="0" err="1"/>
+              <a:t>AutomobileID</a:t>
+            </a:r>
+            <a:r>
+              <a:rPr lang="en-US" sz="2800" dirty="0"/>
+              <a:t>) REFERENCES Automobile(ID)</a:t>
+            </a:r>
+          </a:p>
+          <a:p>
+            <a:r>
+              <a:rPr lang="en-US" sz="2800" dirty="0"/>
+              <a:t>                      ON DELETE CASCADE</a:t>
+            </a:r>
+          </a:p>
+          <a:p>
+            <a:r>
+              <a:rPr lang="en-US" sz="2800" dirty="0"/>
+              <a:t>) ENGINE=INNODB;</a:t>
+            </a:r>
+            <a:endParaRPr lang="en-US" sz="2800" dirty="0"/>
+          </a:p>
+        </p:txBody>
+      </p:sp>
+    </p:spTree>
+    <p:extLst>
+      <p:ext uri="{BB962C8B-B14F-4D97-AF65-F5344CB8AC3E}">
+        <p14:creationId xmlns:p14="http://schemas.microsoft.com/office/powerpoint/2010/main" val="562123201"/>
+      </p:ext>
+    </p:extLst>
+  </p:cSld>
+  <p:clrMapOvr>
+    <a:masterClrMapping/>
+  </p:clrMapOvr>
+</p:sld>
+</file>
+
+<file path=ppt/slides/slide43.xml><?xml version="1.0" encoding="utf-8"?>
+<p:sld xmlns:a="http://schemas.openxmlformats.org/drawingml/2006/main" xmlns:r="http://schemas.openxmlformats.org/officeDocument/2006/relationships" xmlns:p="http://schemas.openxmlformats.org/presentationml/2006/main">
+  <p:cSld>
+    <p:spTree>
+      <p:nvGrpSpPr>
+        <p:cNvPr id="1" name=""/>
+        <p:cNvGrpSpPr/>
+        <p:nvPr/>
+      </p:nvGrpSpPr>
+      <p:grpSpPr>
+        <a:xfrm>
+          <a:off x="0" y="0"/>
+          <a:ext cx="0" cy="0"/>
+          <a:chOff x="0" y="0"/>
+          <a:chExt cx="0" cy="0"/>
+        </a:xfrm>
+      </p:grpSpPr>
+      <p:sp>
+        <p:nvSpPr>
+          <p:cNvPr id="2" name="Title 1"/>
+          <p:cNvSpPr>
+            <a:spLocks noGrp="1"/>
+          </p:cNvSpPr>
+          <p:nvPr>
+            <p:ph type="title"/>
+          </p:nvPr>
+        </p:nvSpPr>
+        <p:spPr>
+          <a:xfrm>
             <a:off x="4292" y="304800"/>
             <a:ext cx="9139707" cy="762000"/>
           </a:xfrm>
@@ -14355,148 +14604,6 @@
     <p:extLst>
       <p:ext uri="{BB962C8B-B14F-4D97-AF65-F5344CB8AC3E}">
         <p14:creationId xmlns:p14="http://schemas.microsoft.com/office/powerpoint/2010/main" val="3463372688"/>
-      </p:ext>
-    </p:extLst>
-  </p:cSld>
-  <p:clrMapOvr>
-    <a:masterClrMapping/>
-  </p:clrMapOvr>
-  <p:timing>
-    <p:tnLst>
-      <p:par>
-        <p:cTn id="1" dur="indefinite" restart="never" nodeType="tmRoot"/>
-      </p:par>
-    </p:tnLst>
-  </p:timing>
-</p:sld>
-</file>
-
-<file path=ppt/slides/slide43.xml><?xml version="1.0" encoding="utf-8"?>
-<p:sld xmlns:a="http://schemas.openxmlformats.org/drawingml/2006/main" xmlns:r="http://schemas.openxmlformats.org/officeDocument/2006/relationships" xmlns:p="http://schemas.openxmlformats.org/presentationml/2006/main">
-  <p:cSld>
-    <p:spTree>
-      <p:nvGrpSpPr>
-        <p:cNvPr id="1" name=""/>
-        <p:cNvGrpSpPr/>
-        <p:nvPr/>
-      </p:nvGrpSpPr>
-      <p:grpSpPr>
-        <a:xfrm>
-          <a:off x="0" y="0"/>
-          <a:ext cx="0" cy="0"/>
-          <a:chOff x="0" y="0"/>
-          <a:chExt cx="0" cy="0"/>
-        </a:xfrm>
-      </p:grpSpPr>
-      <p:sp>
-        <p:nvSpPr>
-          <p:cNvPr id="2" name="Title 1"/>
-          <p:cNvSpPr>
-            <a:spLocks noGrp="1"/>
-          </p:cNvSpPr>
-          <p:nvPr>
-            <p:ph type="title"/>
-          </p:nvPr>
-        </p:nvSpPr>
-        <p:spPr>
-          <a:xfrm>
-            <a:off x="381000" y="0"/>
-            <a:ext cx="8229600" cy="2895600"/>
-          </a:xfrm>
-        </p:spPr>
-        <p:txBody>
-          <a:bodyPr>
-            <a:normAutofit/>
-          </a:bodyPr>
-          <a:lstStyle/>
-          <a:p>
-            <a:r>
-              <a:rPr lang="en-US" b="1" i="1" dirty="0" smtClean="0"/>
-              <a:t>Exercise 10: </a:t>
-            </a:r>
-            <a:r>
-              <a:rPr lang="en-US" b="1" i="1" cap="all" dirty="0" smtClean="0"/>
-              <a:t>Create </a:t>
-            </a:r>
-            <a:r>
-              <a:rPr lang="en-US" b="1" i="1" cap="all" dirty="0"/>
-              <a:t>an Album table.  Relate the Album table to the Band table using a Foreign </a:t>
-            </a:r>
-            <a:r>
-              <a:rPr lang="en-US" b="1" i="1" cap="all" dirty="0" smtClean="0"/>
-              <a:t>Key</a:t>
-            </a:r>
-            <a:endParaRPr lang="en-US" i="1" dirty="0"/>
-          </a:p>
-        </p:txBody>
-      </p:sp>
-      <p:sp>
-        <p:nvSpPr>
-          <p:cNvPr id="3" name="Content Placeholder 2"/>
-          <p:cNvSpPr>
-            <a:spLocks noGrp="1"/>
-          </p:cNvSpPr>
-          <p:nvPr>
-            <p:ph idx="1"/>
-          </p:nvPr>
-        </p:nvSpPr>
-        <p:spPr>
-          <a:xfrm>
-            <a:off x="398318" y="2971800"/>
-            <a:ext cx="8229600" cy="1066800"/>
-          </a:xfrm>
-        </p:spPr>
-        <p:txBody>
-          <a:bodyPr>
-            <a:normAutofit/>
-          </a:bodyPr>
-          <a:lstStyle/>
-          <a:p>
-            <a:r>
-              <a:rPr lang="en-US" dirty="0"/>
-              <a:t>Let’s create the Album </a:t>
-            </a:r>
-            <a:r>
-              <a:rPr lang="en-US" dirty="0" smtClean="0"/>
-              <a:t>table</a:t>
-            </a:r>
-          </a:p>
-        </p:txBody>
-      </p:sp>
-      <p:pic>
-        <p:nvPicPr>
-          <p:cNvPr id="5" name="Picture" descr="A description..."/>
-          <p:cNvPicPr/>
-          <p:nvPr/>
-        </p:nvPicPr>
-        <p:blipFill>
-          <a:blip r:embed="rId2"/>
-          <a:srcRect/>
-          <a:stretch>
-            <a:fillRect/>
-          </a:stretch>
-        </p:blipFill>
-        <p:spPr bwMode="auto">
-          <a:xfrm>
-            <a:off x="381000" y="4191000"/>
-            <a:ext cx="8229600" cy="2362200"/>
-          </a:xfrm>
-          <a:prstGeom prst="rect">
-            <a:avLst/>
-          </a:prstGeom>
-          <a:noFill/>
-          <a:ln w="9525">
-            <a:noFill/>
-            <a:miter lim="800000"/>
-            <a:headEnd/>
-            <a:tailEnd/>
-          </a:ln>
-        </p:spPr>
-      </p:pic>
-    </p:spTree>
-    <p:extLst>
-      <p:ext uri="{BB962C8B-B14F-4D97-AF65-F5344CB8AC3E}">
-        <p14:creationId xmlns:p14="http://schemas.microsoft.com/office/powerpoint/2010/main" val="3353074523"/>
       </p:ext>
     </p:extLst>
   </p:cSld>
@@ -16397,6 +16504,148 @@
         </p:nvSpPr>
         <p:spPr>
           <a:xfrm>
+            <a:off x="381000" y="0"/>
+            <a:ext cx="8229600" cy="2895600"/>
+          </a:xfrm>
+        </p:spPr>
+        <p:txBody>
+          <a:bodyPr>
+            <a:normAutofit/>
+          </a:bodyPr>
+          <a:lstStyle/>
+          <a:p>
+            <a:r>
+              <a:rPr lang="en-US" b="1" i="1" dirty="0" smtClean="0"/>
+              <a:t>Exercise 10: </a:t>
+            </a:r>
+            <a:r>
+              <a:rPr lang="en-US" b="1" i="1" cap="all" dirty="0" smtClean="0"/>
+              <a:t>Create </a:t>
+            </a:r>
+            <a:r>
+              <a:rPr lang="en-US" b="1" i="1" cap="all" dirty="0"/>
+              <a:t>an Album table.  Relate the Album table to the Band table using a Foreign </a:t>
+            </a:r>
+            <a:r>
+              <a:rPr lang="en-US" b="1" i="1" cap="all" dirty="0" smtClean="0"/>
+              <a:t>Key</a:t>
+            </a:r>
+            <a:endParaRPr lang="en-US" i="1" dirty="0"/>
+          </a:p>
+        </p:txBody>
+      </p:sp>
+      <p:sp>
+        <p:nvSpPr>
+          <p:cNvPr id="3" name="Content Placeholder 2"/>
+          <p:cNvSpPr>
+            <a:spLocks noGrp="1"/>
+          </p:cNvSpPr>
+          <p:nvPr>
+            <p:ph idx="1"/>
+          </p:nvPr>
+        </p:nvSpPr>
+        <p:spPr>
+          <a:xfrm>
+            <a:off x="398318" y="2971800"/>
+            <a:ext cx="8229600" cy="1066800"/>
+          </a:xfrm>
+        </p:spPr>
+        <p:txBody>
+          <a:bodyPr>
+            <a:normAutofit/>
+          </a:bodyPr>
+          <a:lstStyle/>
+          <a:p>
+            <a:r>
+              <a:rPr lang="en-US" dirty="0"/>
+              <a:t>Let’s create the Album </a:t>
+            </a:r>
+            <a:r>
+              <a:rPr lang="en-US" dirty="0" smtClean="0"/>
+              <a:t>table</a:t>
+            </a:r>
+          </a:p>
+        </p:txBody>
+      </p:sp>
+      <p:pic>
+        <p:nvPicPr>
+          <p:cNvPr id="5" name="Picture" descr="A description..."/>
+          <p:cNvPicPr/>
+          <p:nvPr/>
+        </p:nvPicPr>
+        <p:blipFill>
+          <a:blip r:embed="rId2"/>
+          <a:srcRect/>
+          <a:stretch>
+            <a:fillRect/>
+          </a:stretch>
+        </p:blipFill>
+        <p:spPr bwMode="auto">
+          <a:xfrm>
+            <a:off x="381000" y="4191000"/>
+            <a:ext cx="8229600" cy="2362200"/>
+          </a:xfrm>
+          <a:prstGeom prst="rect">
+            <a:avLst/>
+          </a:prstGeom>
+          <a:noFill/>
+          <a:ln w="9525">
+            <a:noFill/>
+            <a:miter lim="800000"/>
+            <a:headEnd/>
+            <a:tailEnd/>
+          </a:ln>
+        </p:spPr>
+      </p:pic>
+    </p:spTree>
+    <p:extLst>
+      <p:ext uri="{BB962C8B-B14F-4D97-AF65-F5344CB8AC3E}">
+        <p14:creationId xmlns:p14="http://schemas.microsoft.com/office/powerpoint/2010/main" val="3353074523"/>
+      </p:ext>
+    </p:extLst>
+  </p:cSld>
+  <p:clrMapOvr>
+    <a:masterClrMapping/>
+  </p:clrMapOvr>
+  <p:timing>
+    <p:tnLst>
+      <p:par>
+        <p:cTn id="1" dur="indefinite" restart="never" nodeType="tmRoot"/>
+      </p:par>
+    </p:tnLst>
+  </p:timing>
+</p:sld>
+</file>
+
+<file path=ppt/slides/slide54.xml><?xml version="1.0" encoding="utf-8"?>
+<p:sld xmlns:a="http://schemas.openxmlformats.org/drawingml/2006/main" xmlns:r="http://schemas.openxmlformats.org/officeDocument/2006/relationships" xmlns:p="http://schemas.openxmlformats.org/presentationml/2006/main">
+  <p:cSld>
+    <p:spTree>
+      <p:nvGrpSpPr>
+        <p:cNvPr id="1" name=""/>
+        <p:cNvGrpSpPr/>
+        <p:nvPr/>
+      </p:nvGrpSpPr>
+      <p:grpSpPr>
+        <a:xfrm>
+          <a:off x="0" y="0"/>
+          <a:ext cx="0" cy="0"/>
+          <a:chOff x="0" y="0"/>
+          <a:chExt cx="0" cy="0"/>
+        </a:xfrm>
+      </p:grpSpPr>
+      <p:sp>
+        <p:nvSpPr>
+          <p:cNvPr id="2" name="Title 1"/>
+          <p:cNvSpPr>
+            <a:spLocks noGrp="1"/>
+          </p:cNvSpPr>
+          <p:nvPr>
+            <p:ph type="title"/>
+          </p:nvPr>
+        </p:nvSpPr>
+        <p:spPr>
+          <a:xfrm>
             <a:off x="457200" y="914400"/>
             <a:ext cx="8229600" cy="1143000"/>
           </a:xfrm>
@@ -16476,7 +16725,7 @@
 </p:sld>
 </file>
 
-<file path=ppt/slides/slide54.xml><?xml version="1.0" encoding="utf-8"?>
+<file path=ppt/slides/slide55.xml><?xml version="1.0" encoding="utf-8"?>
 <p:sld xmlns:a="http://schemas.openxmlformats.org/drawingml/2006/main" xmlns:r="http://schemas.openxmlformats.org/officeDocument/2006/relationships" xmlns:p="http://schemas.openxmlformats.org/presentationml/2006/main">
   <p:cSld>
     <p:spTree>

</xml_diff>